<commit_message>
Changed data to begin state
Setting up initial (pre-talk) state
</commit_message>
<xml_diff>
--- a/AsyncTalk.pptx
+++ b/AsyncTalk.pptx
@@ -231,7 +231,7 @@
             <a:fld id="{888A7752-73DE-404C-BA6F-63DEF987950B}" type="datetimeFigureOut">
               <a:rPr lang="en-US" smtClean="0"/>
               <a:pPr/>
-              <a:t>9/27/2013</a:t>
+              <a:t>1/14/2014</a:t>
             </a:fld>
             <a:endParaRPr lang="en-US"/>
           </a:p>
@@ -2114,7 +2114,27 @@
           </a:bodyPr>
           <a:lstStyle/>
           <a:p>
-            <a:endParaRPr lang="en-US"/>
+            <a:r>
+              <a:rPr lang="en-US" dirty="0" err="1" smtClean="0"/>
+              <a:t>AsyncGuiApp</a:t>
+            </a:r>
+            <a:r>
+              <a:rPr lang="en-US" dirty="0" smtClean="0"/>
+              <a:t> in SimpleWPFExample.sln</a:t>
+            </a:r>
+            <a:r>
+              <a:rPr lang="en-US" baseline="0" dirty="0" smtClean="0"/>
+              <a:t> + </a:t>
+            </a:r>
+            <a:r>
+              <a:rPr lang="en-US" baseline="0" dirty="0" err="1" smtClean="0"/>
+              <a:t>CompositeService</a:t>
+            </a:r>
+            <a:r>
+              <a:rPr lang="en-US" baseline="0" dirty="0" smtClean="0"/>
+              <a:t> in AsyncService.sln</a:t>
+            </a:r>
+            <a:endParaRPr lang="en-US" dirty="0"/>
           </a:p>
         </p:txBody>
       </p:sp>
@@ -2288,7 +2308,15 @@
           </a:bodyPr>
           <a:lstStyle/>
           <a:p>
-            <a:endParaRPr lang="en-US"/>
+            <a:r>
+              <a:rPr lang="en-US" dirty="0" err="1" smtClean="0"/>
+              <a:t>Async</a:t>
+            </a:r>
+            <a:r>
+              <a:rPr lang="en-US" baseline="0" dirty="0" smtClean="0"/>
+              <a:t> Examples project from here on…</a:t>
+            </a:r>
+            <a:endParaRPr lang="en-US" dirty="0"/>
           </a:p>
         </p:txBody>
       </p:sp>
@@ -2375,7 +2403,11 @@
           </a:bodyPr>
           <a:lstStyle/>
           <a:p>
-            <a:endParaRPr lang="en-US"/>
+            <a:r>
+              <a:rPr lang="en-US" dirty="0" smtClean="0"/>
+              <a:t>Analogy goes here!</a:t>
+            </a:r>
+            <a:endParaRPr lang="en-US" dirty="0"/>
           </a:p>
         </p:txBody>
       </p:sp>
@@ -2652,7 +2684,7 @@
             <a:fld id="{A8B8E7D2-F905-46E3-BDD3-0258335A3216}" type="datetime1">
               <a:rPr lang="en-US" smtClean="0"/>
               <a:pPr/>
-              <a:t>9/27/2013</a:t>
+              <a:t>1/14/2014</a:t>
             </a:fld>
             <a:endParaRPr lang="en-US" sz="1600" dirty="0"/>
           </a:p>
@@ -3013,7 +3045,7 @@
             <a:fld id="{33938BEC-55E3-4F9D-B5C5-76D23951C04A}" type="datetime1">
               <a:rPr lang="en-US" smtClean="0"/>
               <a:pPr/>
-              <a:t>9/27/2013</a:t>
+              <a:t>1/14/2014</a:t>
             </a:fld>
             <a:endParaRPr lang="en-US"/>
           </a:p>
@@ -3194,7 +3226,7 @@
             <a:fld id="{33938BEC-55E3-4F9D-B5C5-76D23951C04A}" type="datetime1">
               <a:rPr lang="en-US" smtClean="0"/>
               <a:pPr/>
-              <a:t>9/27/2013</a:t>
+              <a:t>1/14/2014</a:t>
             </a:fld>
             <a:endParaRPr lang="en-US"/>
           </a:p>
@@ -3435,7 +3467,7 @@
             <a:fld id="{33938BEC-55E3-4F9D-B5C5-76D23951C04A}" type="datetime1">
               <a:rPr lang="en-US" smtClean="0"/>
               <a:pPr/>
-              <a:t>9/27/2013</a:t>
+              <a:t>1/14/2014</a:t>
             </a:fld>
             <a:endParaRPr lang="en-US" dirty="0"/>
           </a:p>
@@ -3705,7 +3737,7 @@
             <a:fld id="{2FB568A0-62B0-4129-95C4-7270BF844D61}" type="datetime1">
               <a:rPr lang="en-US" smtClean="0"/>
               <a:pPr/>
-              <a:t>9/27/2013</a:t>
+              <a:t>1/14/2014</a:t>
             </a:fld>
             <a:endParaRPr lang="en-US" dirty="0"/>
           </a:p>
@@ -3927,7 +3959,7 @@
             <a:fld id="{A1D7F31A-E594-408B-8114-4F8438303DA3}" type="datetime1">
               <a:rPr lang="en-US" smtClean="0"/>
               <a:pPr/>
-              <a:t>9/27/2013</a:t>
+              <a:t>1/14/2014</a:t>
             </a:fld>
             <a:endParaRPr lang="en-US"/>
           </a:p>
@@ -4281,7 +4313,7 @@
             <a:fld id="{AD978398-2A5A-4309-94C2-82E465C1DCF8}" type="datetime1">
               <a:rPr lang="en-US" smtClean="0"/>
               <a:pPr/>
-              <a:t>9/27/2013</a:t>
+              <a:t>1/14/2014</a:t>
             </a:fld>
             <a:endParaRPr lang="en-US"/>
           </a:p>
@@ -4515,7 +4547,7 @@
             <a:fld id="{33938BEC-55E3-4F9D-B5C5-76D23951C04A}" type="datetime1">
               <a:rPr lang="en-US" smtClean="0"/>
               <a:pPr/>
-              <a:t>9/27/2013</a:t>
+              <a:t>1/14/2014</a:t>
             </a:fld>
             <a:endParaRPr lang="en-US"/>
           </a:p>
@@ -4661,7 +4693,7 @@
             <a:fld id="{D48B58F6-778A-46C2-BFC0-8FD9B04A99E8}" type="datetime1">
               <a:rPr lang="en-US" smtClean="0"/>
               <a:pPr/>
-              <a:t>9/27/2013</a:t>
+              <a:t>1/14/2014</a:t>
             </a:fld>
             <a:endParaRPr lang="en-US"/>
           </a:p>
@@ -4940,7 +4972,7 @@
             <a:fld id="{33938BEC-55E3-4F9D-B5C5-76D23951C04A}" type="datetime1">
               <a:rPr lang="en-US" smtClean="0"/>
               <a:pPr/>
-              <a:t>9/27/2013</a:t>
+              <a:t>1/14/2014</a:t>
             </a:fld>
             <a:endParaRPr lang="en-US"/>
           </a:p>
@@ -5348,7 +5380,7 @@
             <a:fld id="{33938BEC-55E3-4F9D-B5C5-76D23951C04A}" type="datetime1">
               <a:rPr lang="en-US" smtClean="0"/>
               <a:pPr/>
-              <a:t>9/27/2013</a:t>
+              <a:t>1/14/2014</a:t>
             </a:fld>
             <a:endParaRPr lang="en-US"/>
           </a:p>
@@ -5692,7 +5724,7 @@
             <a:fld id="{33938BEC-55E3-4F9D-B5C5-76D23951C04A}" type="datetime1">
               <a:rPr lang="en-US" smtClean="0"/>
               <a:pPr/>
-              <a:t>9/27/2013</a:t>
+              <a:t>1/14/2014</a:t>
             </a:fld>
             <a:endParaRPr lang="en-US" sz="1400" dirty="0">
               <a:solidFill>
@@ -13578,11 +13610,7 @@
             </a:r>
             <a:r>
               <a:rPr lang="en-US" dirty="0" smtClean="0"/>
-              <a:t> due to internal exception </a:t>
-            </a:r>
-            <a:r>
-              <a:rPr lang="en-US" dirty="0" smtClean="0"/>
-              <a:t>handling</a:t>
+              <a:t> due to internal exception handling</a:t>
             </a:r>
           </a:p>
           <a:p>
@@ -13591,16 +13619,11 @@
               <a:rPr lang="en-US" dirty="0" smtClean="0"/>
               <a:t>JIT optimization opportunities may be lost</a:t>
             </a:r>
-            <a:endParaRPr lang="en-US" dirty="0" smtClean="0"/>
-          </a:p>
-          <a:p>
-            <a:r>
-              <a:rPr lang="en-US" dirty="0" smtClean="0"/>
-              <a:t>Watch </a:t>
-            </a:r>
-            <a:r>
-              <a:rPr lang="en-US" dirty="0" smtClean="0"/>
-              <a:t>object lifetime</a:t>
+          </a:p>
+          <a:p>
+            <a:r>
+              <a:rPr lang="en-US" dirty="0" smtClean="0"/>
+              <a:t>Watch object lifetime</a:t>
             </a:r>
           </a:p>
           <a:p>
@@ -13696,11 +13719,7 @@
           <a:p>
             <a:r>
               <a:rPr lang="en-US" dirty="0" smtClean="0"/>
-              <a:t>More </a:t>
-            </a:r>
-            <a:r>
-              <a:rPr lang="en-US" dirty="0" smtClean="0"/>
-              <a:t>Information</a:t>
+              <a:t>More Information</a:t>
             </a:r>
             <a:endParaRPr lang="en-US" dirty="0">
               <a:ln/>

</xml_diff>